<commit_message>
TeraFly version 0.9.80 April 23rd, 2014 -------------------------------------------------------------------------------------------- - New: added annotation toolbar. Existing annotation tools  have been moved  to the toolbar,        that is automatically displayed on the top-left of the Vaa3D renderer. New tools are:        - "1-right click to define a marker"  that simply  mimics the already  existing Vaa3D           feature.        - "1-right click to delete a marker" that delete  an already existing (and displayed) 	  marker by right-clicking on it.        - "1-right stroke to delete a group of markers" (experimental)        - "Show / hide markers around ROI" (not yet implemented) - Fix: fixed "Vaa3D-invoked actions at the highest resolution have been temporarily removed"        warning as this does not cause crashes anymore thanks to the recent bug fixes. --------------------------------------------------------------------------------------------
</commit_message>
<xml_diff>
--- a/released_plugins/v3d_plugins/teramanager/icons.pptx
+++ b/released_plugins/v3d_plugins/teramanager/icons.pptx
@@ -289,7 +289,7 @@
           <a:p>
             <a:fld id="{A3FFFC81-E8A9-43A5-BD7A-0818E158DC6F}" type="datetimeFigureOut">
               <a:rPr lang="en-US" smtClean="0"/>
-              <a:t>4/19/2014</a:t>
+              <a:t>4/22/2014</a:t>
             </a:fld>
             <a:endParaRPr lang="en-US"/>
           </a:p>
@@ -459,7 +459,7 @@
           <a:p>
             <a:fld id="{A3FFFC81-E8A9-43A5-BD7A-0818E158DC6F}" type="datetimeFigureOut">
               <a:rPr lang="en-US" smtClean="0"/>
-              <a:t>4/19/2014</a:t>
+              <a:t>4/22/2014</a:t>
             </a:fld>
             <a:endParaRPr lang="en-US"/>
           </a:p>
@@ -639,7 +639,7 @@
           <a:p>
             <a:fld id="{A3FFFC81-E8A9-43A5-BD7A-0818E158DC6F}" type="datetimeFigureOut">
               <a:rPr lang="en-US" smtClean="0"/>
-              <a:t>4/19/2014</a:t>
+              <a:t>4/22/2014</a:t>
             </a:fld>
             <a:endParaRPr lang="en-US"/>
           </a:p>
@@ -809,7 +809,7 @@
           <a:p>
             <a:fld id="{A3FFFC81-E8A9-43A5-BD7A-0818E158DC6F}" type="datetimeFigureOut">
               <a:rPr lang="en-US" smtClean="0"/>
-              <a:t>4/19/2014</a:t>
+              <a:t>4/22/2014</a:t>
             </a:fld>
             <a:endParaRPr lang="en-US"/>
           </a:p>
@@ -1055,7 +1055,7 @@
           <a:p>
             <a:fld id="{A3FFFC81-E8A9-43A5-BD7A-0818E158DC6F}" type="datetimeFigureOut">
               <a:rPr lang="en-US" smtClean="0"/>
-              <a:t>4/19/2014</a:t>
+              <a:t>4/22/2014</a:t>
             </a:fld>
             <a:endParaRPr lang="en-US"/>
           </a:p>
@@ -1343,7 +1343,7 @@
           <a:p>
             <a:fld id="{A3FFFC81-E8A9-43A5-BD7A-0818E158DC6F}" type="datetimeFigureOut">
               <a:rPr lang="en-US" smtClean="0"/>
-              <a:t>4/19/2014</a:t>
+              <a:t>4/22/2014</a:t>
             </a:fld>
             <a:endParaRPr lang="en-US"/>
           </a:p>
@@ -1765,7 +1765,7 @@
           <a:p>
             <a:fld id="{A3FFFC81-E8A9-43A5-BD7A-0818E158DC6F}" type="datetimeFigureOut">
               <a:rPr lang="en-US" smtClean="0"/>
-              <a:t>4/19/2014</a:t>
+              <a:t>4/22/2014</a:t>
             </a:fld>
             <a:endParaRPr lang="en-US"/>
           </a:p>
@@ -1883,7 +1883,7 @@
           <a:p>
             <a:fld id="{A3FFFC81-E8A9-43A5-BD7A-0818E158DC6F}" type="datetimeFigureOut">
               <a:rPr lang="en-US" smtClean="0"/>
-              <a:t>4/19/2014</a:t>
+              <a:t>4/22/2014</a:t>
             </a:fld>
             <a:endParaRPr lang="en-US"/>
           </a:p>
@@ -1978,7 +1978,7 @@
           <a:p>
             <a:fld id="{A3FFFC81-E8A9-43A5-BD7A-0818E158DC6F}" type="datetimeFigureOut">
               <a:rPr lang="en-US" smtClean="0"/>
-              <a:t>4/19/2014</a:t>
+              <a:t>4/22/2014</a:t>
             </a:fld>
             <a:endParaRPr lang="en-US"/>
           </a:p>
@@ -2255,7 +2255,7 @@
           <a:p>
             <a:fld id="{A3FFFC81-E8A9-43A5-BD7A-0818E158DC6F}" type="datetimeFigureOut">
               <a:rPr lang="en-US" smtClean="0"/>
-              <a:t>4/19/2014</a:t>
+              <a:t>4/22/2014</a:t>
             </a:fld>
             <a:endParaRPr lang="en-US"/>
           </a:p>
@@ -2508,7 +2508,7 @@
           <a:p>
             <a:fld id="{A3FFFC81-E8A9-43A5-BD7A-0818E158DC6F}" type="datetimeFigureOut">
               <a:rPr lang="en-US" smtClean="0"/>
-              <a:t>4/19/2014</a:t>
+              <a:t>4/22/2014</a:t>
             </a:fld>
             <a:endParaRPr lang="en-US"/>
           </a:p>
@@ -2721,7 +2721,7 @@
           <a:p>
             <a:fld id="{A3FFFC81-E8A9-43A5-BD7A-0818E158DC6F}" type="datetimeFigureOut">
               <a:rPr lang="en-US" smtClean="0"/>
-              <a:t>4/19/2014</a:t>
+              <a:t>4/22/2014</a:t>
             </a:fld>
             <a:endParaRPr lang="en-US"/>
           </a:p>
@@ -4957,16 +4957,16 @@
       </p:grpSpPr>
       <p:grpSp>
         <p:nvGrpSpPr>
-          <p:cNvPr id="10" name="Gruppo 9"/>
+          <p:cNvPr id="3" name="Gruppo 2"/>
           <p:cNvGrpSpPr/>
           <p:nvPr/>
         </p:nvGrpSpPr>
         <p:grpSpPr>
           <a:xfrm>
-            <a:off x="4148237" y="2150125"/>
-            <a:ext cx="1216243" cy="1221118"/>
-            <a:chOff x="4148237" y="2150125"/>
-            <a:chExt cx="1216243" cy="1221118"/>
+            <a:off x="1371600" y="1357257"/>
+            <a:ext cx="457200" cy="558339"/>
+            <a:chOff x="4038600" y="2014482"/>
+            <a:chExt cx="457200" cy="558339"/>
           </a:xfrm>
         </p:grpSpPr>
         <p:grpSp>
@@ -4979,8 +4979,8 @@
           </p:nvGrpSpPr>
           <p:grpSpPr>
             <a:xfrm>
-              <a:off x="4611686" y="2611979"/>
-              <a:ext cx="752794" cy="759264"/>
+              <a:off x="4129088" y="2212564"/>
+              <a:ext cx="357187" cy="360257"/>
               <a:chOff x="4550726" y="2373219"/>
               <a:chExt cx="1147140" cy="1156996"/>
             </a:xfrm>
@@ -5089,14 +5089,14 @@
         </p:grpSp>
         <p:pic>
           <p:nvPicPr>
-            <p:cNvPr id="4" name="Picture 3" descr="C:\Users\Administrator\Downloads\114977-magic-marker-icon-business-cursor.png"/>
+            <p:cNvPr id="1026" name="Picture 2" descr="C:\Users\Administrator\Downloads\o_7036c989068210a0-0.png"/>
             <p:cNvPicPr>
               <a:picLocks noChangeAspect="1" noChangeArrowheads="1"/>
             </p:cNvPicPr>
             <p:nvPr/>
           </p:nvPicPr>
           <p:blipFill>
-            <a:blip r:embed="rId3" cstate="print">
+            <a:blip r:embed="rId3">
               <a:extLst>
                 <a:ext uri="{28A0092B-C50C-407E-A947-70E740481C1C}">
                   <a14:useLocalDpi xmlns:a14="http://schemas.microsoft.com/office/drawing/2010/main" val="0"/>
@@ -5110,8 +5110,955 @@
           </p:blipFill>
           <p:spPr bwMode="auto">
             <a:xfrm>
-              <a:off x="4148237" y="2150125"/>
-              <a:ext cx="1088104" cy="1088104"/>
+              <a:off x="4038600" y="2014482"/>
+              <a:ext cx="457200" cy="457200"/>
+            </a:xfrm>
+            <a:prstGeom prst="rect">
+              <a:avLst/>
+            </a:prstGeom>
+            <a:noFill/>
+            <a:extLst>
+              <a:ext uri="{909E8E84-426E-40DD-AFC4-6F175D3DCCD1}">
+                <a14:hiddenFill xmlns:a14="http://schemas.microsoft.com/office/drawing/2010/main">
+                  <a:solidFill>
+                    <a:srgbClr val="FFFFFF"/>
+                  </a:solidFill>
+                </a14:hiddenFill>
+              </a:ext>
+            </a:extLst>
+          </p:spPr>
+        </p:pic>
+      </p:grpSp>
+      <p:grpSp>
+        <p:nvGrpSpPr>
+          <p:cNvPr id="5" name="Gruppo 4"/>
+          <p:cNvGrpSpPr/>
+          <p:nvPr/>
+        </p:nvGrpSpPr>
+        <p:grpSpPr>
+          <a:xfrm>
+            <a:off x="2406517" y="1333283"/>
+            <a:ext cx="457200" cy="576967"/>
+            <a:chOff x="2406517" y="1333283"/>
+            <a:chExt cx="457200" cy="576967"/>
+          </a:xfrm>
+        </p:grpSpPr>
+        <p:grpSp>
+          <p:nvGrpSpPr>
+            <p:cNvPr id="17" name="Gruppo 16"/>
+            <p:cNvGrpSpPr>
+              <a:grpSpLocks noChangeAspect="1"/>
+            </p:cNvGrpSpPr>
+            <p:nvPr/>
+          </p:nvGrpSpPr>
+          <p:grpSpPr>
+            <a:xfrm>
+              <a:off x="2490354" y="1529955"/>
+              <a:ext cx="373363" cy="380295"/>
+              <a:chOff x="6246176" y="1793776"/>
+              <a:chExt cx="1196207" cy="1218416"/>
+            </a:xfrm>
+          </p:grpSpPr>
+          <p:sp>
+            <p:nvSpPr>
+              <p:cNvPr id="19" name="Ovale 18"/>
+              <p:cNvSpPr/>
+              <p:nvPr/>
+            </p:nvSpPr>
+            <p:spPr>
+              <a:xfrm>
+                <a:off x="6246176" y="1793776"/>
+                <a:ext cx="1080000" cy="1080000"/>
+              </a:xfrm>
+              <a:prstGeom prst="ellipse">
+                <a:avLst/>
+              </a:prstGeom>
+              <a:solidFill>
+                <a:schemeClr val="accent1"/>
+              </a:solidFill>
+              <a:ln>
+                <a:noFill/>
+              </a:ln>
+              <a:effectLst/>
+              <a:scene3d>
+                <a:camera prst="isometricLeftDown">
+                  <a:rot lat="0" lon="0" rev="0"/>
+                </a:camera>
+                <a:lightRig rig="soft" dir="t"/>
+              </a:scene3d>
+              <a:sp3d prstMaterial="plastic">
+                <a:bevelT w="508000" h="508000"/>
+                <a:bevelB w="508000" h="508000" prst="coolSlant"/>
+                <a:contourClr>
+                  <a:schemeClr val="bg1"/>
+                </a:contourClr>
+              </a:sp3d>
+            </p:spPr>
+            <p:style>
+              <a:lnRef idx="2">
+                <a:schemeClr val="accent1">
+                  <a:shade val="50000"/>
+                </a:schemeClr>
+              </a:lnRef>
+              <a:fillRef idx="1">
+                <a:schemeClr val="accent1"/>
+              </a:fillRef>
+              <a:effectRef idx="0">
+                <a:schemeClr val="accent1"/>
+              </a:effectRef>
+              <a:fontRef idx="minor">
+                <a:schemeClr val="lt1"/>
+              </a:fontRef>
+            </p:style>
+            <p:txBody>
+              <a:bodyPr rtlCol="0" anchor="ctr"/>
+              <a:lstStyle/>
+              <a:p>
+                <a:pPr algn="ctr"/>
+                <a:endParaRPr lang="en-US"/>
+              </a:p>
+            </p:txBody>
+          </p:sp>
+          <p:pic>
+            <p:nvPicPr>
+              <p:cNvPr id="20" name="Picture 4" descr="C:\Users\Administrator\Downloads\DeleteRed.png"/>
+              <p:cNvPicPr>
+                <a:picLocks noChangeAspect="1" noChangeArrowheads="1"/>
+              </p:cNvPicPr>
+              <p:nvPr/>
+            </p:nvPicPr>
+            <p:blipFill>
+              <a:blip r:embed="rId4" cstate="print">
+                <a:extLst>
+                  <a:ext uri="{28A0092B-C50C-407E-A947-70E740481C1C}">
+                    <a14:useLocalDpi xmlns:a14="http://schemas.microsoft.com/office/drawing/2010/main" val="0"/>
+                  </a:ext>
+                </a:extLst>
+              </a:blip>
+              <a:srcRect/>
+              <a:stretch>
+                <a:fillRect/>
+              </a:stretch>
+            </p:blipFill>
+            <p:spPr bwMode="auto">
+              <a:xfrm>
+                <a:off x="6650295" y="2220104"/>
+                <a:ext cx="792088" cy="792088"/>
+              </a:xfrm>
+              <a:prstGeom prst="rect">
+                <a:avLst/>
+              </a:prstGeom>
+              <a:noFill/>
+              <a:extLst>
+                <a:ext uri="{909E8E84-426E-40DD-AFC4-6F175D3DCCD1}">
+                  <a14:hiddenFill xmlns:a14="http://schemas.microsoft.com/office/drawing/2010/main">
+                    <a:solidFill>
+                      <a:srgbClr val="FFFFFF"/>
+                    </a:solidFill>
+                  </a14:hiddenFill>
+                </a:ext>
+              </a:extLst>
+            </p:spPr>
+          </p:pic>
+        </p:grpSp>
+        <p:pic>
+          <p:nvPicPr>
+            <p:cNvPr id="13" name="Picture 2" descr="C:\Users\Administrator\Downloads\o_7036c989068210a0-0.png"/>
+            <p:cNvPicPr>
+              <a:picLocks noChangeAspect="1" noChangeArrowheads="1"/>
+            </p:cNvPicPr>
+            <p:nvPr/>
+          </p:nvPicPr>
+          <p:blipFill>
+            <a:blip r:embed="rId3">
+              <a:extLst>
+                <a:ext uri="{28A0092B-C50C-407E-A947-70E740481C1C}">
+                  <a14:useLocalDpi xmlns:a14="http://schemas.microsoft.com/office/drawing/2010/main" val="0"/>
+                </a:ext>
+              </a:extLst>
+            </a:blip>
+            <a:srcRect/>
+            <a:stretch>
+              <a:fillRect/>
+            </a:stretch>
+          </p:blipFill>
+          <p:spPr bwMode="auto">
+            <a:xfrm>
+              <a:off x="2406517" y="1333283"/>
+              <a:ext cx="457200" cy="457200"/>
+            </a:xfrm>
+            <a:prstGeom prst="rect">
+              <a:avLst/>
+            </a:prstGeom>
+            <a:noFill/>
+            <a:extLst>
+              <a:ext uri="{909E8E84-426E-40DD-AFC4-6F175D3DCCD1}">
+                <a14:hiddenFill xmlns:a14="http://schemas.microsoft.com/office/drawing/2010/main">
+                  <a:solidFill>
+                    <a:srgbClr val="FFFFFF"/>
+                  </a:solidFill>
+                </a14:hiddenFill>
+              </a:ext>
+            </a:extLst>
+          </p:spPr>
+        </p:pic>
+      </p:grpSp>
+      <p:grpSp>
+        <p:nvGrpSpPr>
+          <p:cNvPr id="6" name="Gruppo 5"/>
+          <p:cNvGrpSpPr/>
+          <p:nvPr/>
+        </p:nvGrpSpPr>
+        <p:grpSpPr>
+          <a:xfrm>
+            <a:off x="3388360" y="1351911"/>
+            <a:ext cx="459922" cy="580679"/>
+            <a:chOff x="3388360" y="1351911"/>
+            <a:chExt cx="459922" cy="580679"/>
+          </a:xfrm>
+        </p:grpSpPr>
+        <p:sp>
+          <p:nvSpPr>
+            <p:cNvPr id="27" name="Ovale 26"/>
+            <p:cNvSpPr/>
+            <p:nvPr/>
+          </p:nvSpPr>
+          <p:spPr>
+            <a:xfrm rot="19142320" flipH="1">
+              <a:off x="3450379" y="1587773"/>
+              <a:ext cx="384864" cy="269271"/>
+            </a:xfrm>
+            <a:prstGeom prst="ellipse">
+              <a:avLst/>
+            </a:prstGeom>
+            <a:solidFill>
+              <a:schemeClr val="bg1">
+                <a:alpha val="37000"/>
+              </a:schemeClr>
+            </a:solidFill>
+            <a:ln w="12700">
+              <a:prstDash val="dash"/>
+            </a:ln>
+          </p:spPr>
+          <p:style>
+            <a:lnRef idx="2">
+              <a:schemeClr val="accent1">
+                <a:shade val="50000"/>
+              </a:schemeClr>
+            </a:lnRef>
+            <a:fillRef idx="1">
+              <a:schemeClr val="accent1"/>
+            </a:fillRef>
+            <a:effectRef idx="0">
+              <a:schemeClr val="accent1"/>
+            </a:effectRef>
+            <a:fontRef idx="minor">
+              <a:schemeClr val="lt1"/>
+            </a:fontRef>
+          </p:style>
+          <p:txBody>
+            <a:bodyPr rtlCol="0" anchor="ctr"/>
+            <a:lstStyle/>
+            <a:p>
+              <a:pPr algn="ctr"/>
+              <a:endParaRPr lang="en-US"/>
+            </a:p>
+          </p:txBody>
+        </p:sp>
+        <p:pic>
+          <p:nvPicPr>
+            <p:cNvPr id="29" name="Immagine 28"/>
+            <p:cNvPicPr>
+              <a:picLocks noChangeAspect="1"/>
+            </p:cNvPicPr>
+            <p:nvPr/>
+          </p:nvPicPr>
+          <p:blipFill>
+            <a:blip r:embed="rId5" cstate="print">
+              <a:extLst>
+                <a:ext uri="{28A0092B-C50C-407E-A947-70E740481C1C}">
+                  <a14:useLocalDpi xmlns:a14="http://schemas.microsoft.com/office/drawing/2010/main" val="0"/>
+                </a:ext>
+              </a:extLst>
+            </a:blip>
+            <a:stretch>
+              <a:fillRect/>
+            </a:stretch>
+          </p:blipFill>
+          <p:spPr>
+            <a:xfrm>
+              <a:off x="3686412" y="1585857"/>
+              <a:ext cx="67917" cy="67917"/>
+            </a:xfrm>
+            <a:prstGeom prst="rect">
+              <a:avLst/>
+            </a:prstGeom>
+          </p:spPr>
+        </p:pic>
+        <p:pic>
+          <p:nvPicPr>
+            <p:cNvPr id="30" name="Immagine 29"/>
+            <p:cNvPicPr>
+              <a:picLocks noChangeAspect="1"/>
+            </p:cNvPicPr>
+            <p:nvPr/>
+          </p:nvPicPr>
+          <p:blipFill>
+            <a:blip r:embed="rId5" cstate="print">
+              <a:extLst>
+                <a:ext uri="{28A0092B-C50C-407E-A947-70E740481C1C}">
+                  <a14:useLocalDpi xmlns:a14="http://schemas.microsoft.com/office/drawing/2010/main" val="0"/>
+                </a:ext>
+              </a:extLst>
+            </a:blip>
+            <a:stretch>
+              <a:fillRect/>
+            </a:stretch>
+          </p:blipFill>
+          <p:spPr>
+            <a:xfrm>
+              <a:off x="3498503" y="1763787"/>
+              <a:ext cx="67917" cy="67917"/>
+            </a:xfrm>
+            <a:prstGeom prst="rect">
+              <a:avLst/>
+            </a:prstGeom>
+          </p:spPr>
+        </p:pic>
+        <p:pic>
+          <p:nvPicPr>
+            <p:cNvPr id="31" name="Immagine 30"/>
+            <p:cNvPicPr>
+              <a:picLocks noChangeAspect="1"/>
+            </p:cNvPicPr>
+            <p:nvPr/>
+          </p:nvPicPr>
+          <p:blipFill>
+            <a:blip r:embed="rId5" cstate="print">
+              <a:extLst>
+                <a:ext uri="{28A0092B-C50C-407E-A947-70E740481C1C}">
+                  <a14:useLocalDpi xmlns:a14="http://schemas.microsoft.com/office/drawing/2010/main" val="0"/>
+                </a:ext>
+              </a:extLst>
+            </a:blip>
+            <a:stretch>
+              <a:fillRect/>
+            </a:stretch>
+          </p:blipFill>
+          <p:spPr>
+            <a:xfrm>
+              <a:off x="3576802" y="1639202"/>
+              <a:ext cx="67917" cy="67917"/>
+            </a:xfrm>
+            <a:prstGeom prst="rect">
+              <a:avLst/>
+            </a:prstGeom>
+          </p:spPr>
+        </p:pic>
+        <p:pic>
+          <p:nvPicPr>
+            <p:cNvPr id="32" name="Picture 4" descr="C:\Users\Administrator\Downloads\DeleteRed.png"/>
+            <p:cNvPicPr>
+              <a:picLocks noChangeAspect="1" noChangeArrowheads="1"/>
+            </p:cNvPicPr>
+            <p:nvPr/>
+          </p:nvPicPr>
+          <p:blipFill>
+            <a:blip r:embed="rId6" cstate="print">
+              <a:extLst>
+                <a:ext uri="{28A0092B-C50C-407E-A947-70E740481C1C}">
+                  <a14:useLocalDpi xmlns:a14="http://schemas.microsoft.com/office/drawing/2010/main" val="0"/>
+                </a:ext>
+              </a:extLst>
+            </a:blip>
+            <a:srcRect/>
+            <a:stretch>
+              <a:fillRect/>
+            </a:stretch>
+          </p:blipFill>
+          <p:spPr bwMode="auto">
+            <a:xfrm>
+              <a:off x="3599225" y="1683532"/>
+              <a:ext cx="249057" cy="249058"/>
+            </a:xfrm>
+            <a:prstGeom prst="rect">
+              <a:avLst/>
+            </a:prstGeom>
+            <a:noFill/>
+            <a:extLst>
+              <a:ext uri="{909E8E84-426E-40DD-AFC4-6F175D3DCCD1}">
+                <a14:hiddenFill xmlns:a14="http://schemas.microsoft.com/office/drawing/2010/main">
+                  <a:solidFill>
+                    <a:srgbClr val="FFFFFF"/>
+                  </a:solidFill>
+                </a14:hiddenFill>
+              </a:ext>
+            </a:extLst>
+          </p:spPr>
+        </p:pic>
+        <p:pic>
+          <p:nvPicPr>
+            <p:cNvPr id="23" name="Picture 2" descr="C:\Users\Administrator\Downloads\o_7036c989068210a0-0.png"/>
+            <p:cNvPicPr>
+              <a:picLocks noChangeAspect="1" noChangeArrowheads="1"/>
+            </p:cNvPicPr>
+            <p:nvPr/>
+          </p:nvPicPr>
+          <p:blipFill>
+            <a:blip r:embed="rId3">
+              <a:extLst>
+                <a:ext uri="{28A0092B-C50C-407E-A947-70E740481C1C}">
+                  <a14:useLocalDpi xmlns:a14="http://schemas.microsoft.com/office/drawing/2010/main" val="0"/>
+                </a:ext>
+              </a:extLst>
+            </a:blip>
+            <a:srcRect/>
+            <a:stretch>
+              <a:fillRect/>
+            </a:stretch>
+          </p:blipFill>
+          <p:spPr bwMode="auto">
+            <a:xfrm>
+              <a:off x="3388360" y="1351911"/>
+              <a:ext cx="457200" cy="457200"/>
+            </a:xfrm>
+            <a:prstGeom prst="rect">
+              <a:avLst/>
+            </a:prstGeom>
+            <a:noFill/>
+            <a:extLst>
+              <a:ext uri="{909E8E84-426E-40DD-AFC4-6F175D3DCCD1}">
+                <a14:hiddenFill xmlns:a14="http://schemas.microsoft.com/office/drawing/2010/main">
+                  <a:solidFill>
+                    <a:srgbClr val="FFFFFF"/>
+                  </a:solidFill>
+                </a14:hiddenFill>
+              </a:ext>
+            </a:extLst>
+          </p:spPr>
+        </p:pic>
+      </p:grpSp>
+      <p:grpSp>
+        <p:nvGrpSpPr>
+          <p:cNvPr id="53" name="Gruppo 52"/>
+          <p:cNvGrpSpPr>
+            <a:grpSpLocks noChangeAspect="1"/>
+          </p:cNvGrpSpPr>
+          <p:nvPr/>
+        </p:nvGrpSpPr>
+        <p:grpSpPr>
+          <a:xfrm>
+            <a:off x="723555" y="2504956"/>
+            <a:ext cx="1080000" cy="1080000"/>
+            <a:chOff x="3962400" y="2819400"/>
+            <a:chExt cx="1219200" cy="1219200"/>
+          </a:xfrm>
+        </p:grpSpPr>
+        <p:pic>
+          <p:nvPicPr>
+            <p:cNvPr id="1029" name="Picture 5" descr="D:\Vaa3D\vaa3d_tools\released_plugins\v3d_plugins\teramanager\icons\open_ano.png"/>
+            <p:cNvPicPr>
+              <a:picLocks noChangeAspect="1" noChangeArrowheads="1"/>
+            </p:cNvPicPr>
+            <p:nvPr/>
+          </p:nvPicPr>
+          <p:blipFill>
+            <a:blip r:embed="rId7">
+              <a:extLst>
+                <a:ext uri="{28A0092B-C50C-407E-A947-70E740481C1C}">
+                  <a14:useLocalDpi xmlns:a14="http://schemas.microsoft.com/office/drawing/2010/main" val="0"/>
+                </a:ext>
+              </a:extLst>
+            </a:blip>
+            <a:srcRect/>
+            <a:stretch>
+              <a:fillRect/>
+            </a:stretch>
+          </p:blipFill>
+          <p:spPr bwMode="auto">
+            <a:xfrm>
+              <a:off x="3962400" y="2819400"/>
+              <a:ext cx="1219200" cy="1219200"/>
+            </a:xfrm>
+            <a:prstGeom prst="rect">
+              <a:avLst/>
+            </a:prstGeom>
+            <a:noFill/>
+            <a:extLst>
+              <a:ext uri="{909E8E84-426E-40DD-AFC4-6F175D3DCCD1}">
+                <a14:hiddenFill xmlns:a14="http://schemas.microsoft.com/office/drawing/2010/main">
+                  <a:solidFill>
+                    <a:srgbClr val="FFFFFF"/>
+                  </a:solidFill>
+                </a14:hiddenFill>
+              </a:ext>
+            </a:extLst>
+          </p:spPr>
+        </p:pic>
+        <p:sp>
+          <p:nvSpPr>
+            <p:cNvPr id="33" name="Rettangolo arrotondato 32"/>
+            <p:cNvSpPr/>
+            <p:nvPr/>
+          </p:nvSpPr>
+          <p:spPr>
+            <a:xfrm>
+              <a:off x="4251960" y="2987040"/>
+              <a:ext cx="648000" cy="274320"/>
+            </a:xfrm>
+            <a:prstGeom prst="roundRect">
+              <a:avLst/>
+            </a:prstGeom>
+            <a:ln>
+              <a:noFill/>
+            </a:ln>
+            <a:effectLst>
+              <a:outerShdw blurRad="44450" dist="27940" dir="5400000" algn="ctr">
+                <a:srgbClr val="000000">
+                  <a:alpha val="32000"/>
+                </a:srgbClr>
+              </a:outerShdw>
+            </a:effectLst>
+            <a:scene3d>
+              <a:camera prst="orthographicFront">
+                <a:rot lat="0" lon="0" rev="0"/>
+              </a:camera>
+              <a:lightRig rig="balanced" dir="t">
+                <a:rot lat="0" lon="0" rev="8700000"/>
+              </a:lightRig>
+            </a:scene3d>
+            <a:sp3d>
+              <a:bevelT w="190500" h="38100"/>
+            </a:sp3d>
+          </p:spPr>
+          <p:style>
+            <a:lnRef idx="2">
+              <a:schemeClr val="accent1">
+                <a:shade val="50000"/>
+              </a:schemeClr>
+            </a:lnRef>
+            <a:fillRef idx="1">
+              <a:schemeClr val="accent1"/>
+            </a:fillRef>
+            <a:effectRef idx="0">
+              <a:schemeClr val="accent1"/>
+            </a:effectRef>
+            <a:fontRef idx="minor">
+              <a:schemeClr val="lt1"/>
+            </a:fontRef>
+          </p:style>
+          <p:txBody>
+            <a:bodyPr lIns="0" tIns="0" rIns="0" bIns="0" rtlCol="0" anchor="ctr"/>
+            <a:lstStyle/>
+            <a:p>
+              <a:pPr algn="ctr"/>
+              <a:r>
+                <a:rPr lang="en-US" sz="1600" b="1" smtClean="0">
+                  <a:latin typeface="Arial" pitchFamily="34" charset="0"/>
+                  <a:ea typeface="Adobe Heiti Std R" pitchFamily="34" charset="-128"/>
+                  <a:cs typeface="Arial" pitchFamily="34" charset="0"/>
+                </a:rPr>
+                <a:t>ANO</a:t>
+              </a:r>
+              <a:endParaRPr lang="en-US" sz="1600" b="1">
+                <a:latin typeface="Arial" pitchFamily="34" charset="0"/>
+                <a:ea typeface="Adobe Heiti Std R" pitchFamily="34" charset="-128"/>
+                <a:cs typeface="Arial" pitchFamily="34" charset="0"/>
+              </a:endParaRPr>
+            </a:p>
+          </p:txBody>
+        </p:sp>
+      </p:grpSp>
+      <p:cxnSp>
+        <p:nvCxnSpPr>
+          <p:cNvPr id="65" name="Connettore 1 64"/>
+          <p:cNvCxnSpPr/>
+          <p:nvPr/>
+        </p:nvCxnSpPr>
+        <p:spPr>
+          <a:xfrm flipV="1">
+            <a:off x="6246176" y="241216"/>
+            <a:ext cx="0" cy="4230480"/>
+          </a:xfrm>
+          <a:prstGeom prst="line">
+            <a:avLst/>
+          </a:prstGeom>
+        </p:spPr>
+        <p:style>
+          <a:lnRef idx="1">
+            <a:schemeClr val="accent1"/>
+          </a:lnRef>
+          <a:fillRef idx="0">
+            <a:schemeClr val="accent1"/>
+          </a:fillRef>
+          <a:effectRef idx="0">
+            <a:schemeClr val="accent1"/>
+          </a:effectRef>
+          <a:fontRef idx="minor">
+            <a:schemeClr val="tx1"/>
+          </a:fontRef>
+        </p:style>
+      </p:cxnSp>
+      <p:cxnSp>
+        <p:nvCxnSpPr>
+          <p:cNvPr id="66" name="Connettore 1 65"/>
+          <p:cNvCxnSpPr/>
+          <p:nvPr/>
+        </p:nvCxnSpPr>
+        <p:spPr>
+          <a:xfrm flipV="1">
+            <a:off x="7326176" y="247396"/>
+            <a:ext cx="0" cy="6069584"/>
+          </a:xfrm>
+          <a:prstGeom prst="line">
+            <a:avLst/>
+          </a:prstGeom>
+        </p:spPr>
+        <p:style>
+          <a:lnRef idx="1">
+            <a:schemeClr val="accent1"/>
+          </a:lnRef>
+          <a:fillRef idx="0">
+            <a:schemeClr val="accent1"/>
+          </a:fillRef>
+          <a:effectRef idx="0">
+            <a:schemeClr val="accent1"/>
+          </a:effectRef>
+          <a:fontRef idx="minor">
+            <a:schemeClr val="tx1"/>
+          </a:fontRef>
+        </p:style>
+      </p:cxnSp>
+      <p:cxnSp>
+        <p:nvCxnSpPr>
+          <p:cNvPr id="67" name="Connettore 1 66"/>
+          <p:cNvCxnSpPr/>
+          <p:nvPr/>
+        </p:nvCxnSpPr>
+        <p:spPr>
+          <a:xfrm flipH="1">
+            <a:off x="4182691" y="422656"/>
+            <a:ext cx="4831373" cy="0"/>
+          </a:xfrm>
+          <a:prstGeom prst="line">
+            <a:avLst/>
+          </a:prstGeom>
+        </p:spPr>
+        <p:style>
+          <a:lnRef idx="1">
+            <a:schemeClr val="accent1"/>
+          </a:lnRef>
+          <a:fillRef idx="0">
+            <a:schemeClr val="accent1"/>
+          </a:fillRef>
+          <a:effectRef idx="0">
+            <a:schemeClr val="accent1"/>
+          </a:effectRef>
+          <a:fontRef idx="minor">
+            <a:schemeClr val="tx1"/>
+          </a:fontRef>
+        </p:style>
+      </p:cxnSp>
+      <p:cxnSp>
+        <p:nvCxnSpPr>
+          <p:cNvPr id="70" name="Connettore 1 69"/>
+          <p:cNvCxnSpPr/>
+          <p:nvPr/>
+        </p:nvCxnSpPr>
+        <p:spPr>
+          <a:xfrm flipH="1">
+            <a:off x="3845560" y="1566515"/>
+            <a:ext cx="4831373" cy="0"/>
+          </a:xfrm>
+          <a:prstGeom prst="line">
+            <a:avLst/>
+          </a:prstGeom>
+        </p:spPr>
+        <p:style>
+          <a:lnRef idx="1">
+            <a:schemeClr val="accent1"/>
+          </a:lnRef>
+          <a:fillRef idx="0">
+            <a:schemeClr val="accent1"/>
+          </a:fillRef>
+          <a:effectRef idx="0">
+            <a:schemeClr val="accent1"/>
+          </a:effectRef>
+          <a:fontRef idx="minor">
+            <a:schemeClr val="tx1"/>
+          </a:fontRef>
+        </p:style>
+      </p:cxnSp>
+      <p:pic>
+        <p:nvPicPr>
+          <p:cNvPr id="1033" name="Picture 9" descr="D:\Vaa3D\vaa3d_tools\released_plugins\v3d_plugins\teramanager\icons\save.png"/>
+          <p:cNvPicPr>
+            <a:picLocks noChangeAspect="1" noChangeArrowheads="1"/>
+          </p:cNvPicPr>
+          <p:nvPr/>
+        </p:nvPicPr>
+        <p:blipFill>
+          <a:blip r:embed="rId8">
+            <a:extLst>
+              <a:ext uri="{BEBA8EAE-BF5A-486C-A8C5-ECC9F3942E4B}">
+                <a14:imgProps xmlns:a14="http://schemas.microsoft.com/office/drawing/2010/main">
+                  <a14:imgLayer r:embed="rId9">
+                    <a14:imgEffect>
+                      <a14:colorTemperature colorTemp="4700"/>
+                    </a14:imgEffect>
+                  </a14:imgLayer>
+                </a14:imgProps>
+              </a:ext>
+              <a:ext uri="{28A0092B-C50C-407E-A947-70E740481C1C}">
+                <a14:useLocalDpi xmlns:a14="http://schemas.microsoft.com/office/drawing/2010/main" val="0"/>
+              </a:ext>
+            </a:extLst>
+          </a:blip>
+          <a:srcRect/>
+          <a:stretch>
+            <a:fillRect/>
+          </a:stretch>
+        </p:blipFill>
+        <p:spPr bwMode="auto">
+          <a:xfrm>
+            <a:off x="2888903" y="2896456"/>
+            <a:ext cx="1219200" cy="1161899"/>
+          </a:xfrm>
+          <a:prstGeom prst="rect">
+            <a:avLst/>
+          </a:prstGeom>
+          <a:noFill/>
+          <a:extLst>
+            <a:ext uri="{909E8E84-426E-40DD-AFC4-6F175D3DCCD1}">
+              <a14:hiddenFill xmlns:a14="http://schemas.microsoft.com/office/drawing/2010/main">
+                <a:solidFill>
+                  <a:srgbClr val="FFFFFF"/>
+                </a:solidFill>
+              </a14:hiddenFill>
+            </a:ext>
+          </a:extLst>
+        </p:spPr>
+      </p:pic>
+      <p:pic>
+        <p:nvPicPr>
+          <p:cNvPr id="1034" name="Picture 10" descr="D:\Vaa3D\vaa3d_tools\released_plugins\v3d_plugins\teramanager\icons\saveas.png"/>
+          <p:cNvPicPr>
+            <a:picLocks noChangeAspect="1" noChangeArrowheads="1"/>
+          </p:cNvPicPr>
+          <p:nvPr/>
+        </p:nvPicPr>
+        <p:blipFill>
+          <a:blip r:embed="rId10">
+            <a:extLst>
+              <a:ext uri="{BEBA8EAE-BF5A-486C-A8C5-ECC9F3942E4B}">
+                <a14:imgProps xmlns:a14="http://schemas.microsoft.com/office/drawing/2010/main">
+                  <a14:imgLayer r:embed="rId11">
+                    <a14:imgEffect>
+                      <a14:colorTemperature colorTemp="4700"/>
+                    </a14:imgEffect>
+                  </a14:imgLayer>
+                </a14:imgProps>
+              </a:ext>
+              <a:ext uri="{28A0092B-C50C-407E-A947-70E740481C1C}">
+                <a14:useLocalDpi xmlns:a14="http://schemas.microsoft.com/office/drawing/2010/main" val="0"/>
+              </a:ext>
+            </a:extLst>
+          </a:blip>
+          <a:srcRect/>
+          <a:stretch>
+            <a:fillRect/>
+          </a:stretch>
+        </p:blipFill>
+        <p:spPr bwMode="auto">
+          <a:xfrm>
+            <a:off x="1371600" y="3527316"/>
+            <a:ext cx="1219200" cy="1148478"/>
+          </a:xfrm>
+          <a:prstGeom prst="rect">
+            <a:avLst/>
+          </a:prstGeom>
+          <a:noFill/>
+          <a:extLst>
+            <a:ext uri="{909E8E84-426E-40DD-AFC4-6F175D3DCCD1}">
+              <a14:hiddenFill xmlns:a14="http://schemas.microsoft.com/office/drawing/2010/main">
+                <a:solidFill>
+                  <a:srgbClr val="FFFFFF"/>
+                </a:solidFill>
+              </a14:hiddenFill>
+            </a:ext>
+          </a:extLst>
+        </p:spPr>
+      </p:pic>
+      <p:sp>
+        <p:nvSpPr>
+          <p:cNvPr id="76" name="AutoShape 15" descr="data:image/jpeg;base64,/9j/4AAQSkZJRgABAQAAAQABAAD/2wCEAAkGBxQTEhUUEhAUEBEQFhgYFBQVFA8PDxAXFxQXFxYSFBQYHCggGBolHBQVITEhJSkrLi4uFx8zODMsNygtLisBCgoKDg0OGhAQGiwkICQsLCwsNiwsOC0sLCwsLCwsLiwsNSwvNywsLCwsLCw0LC8tLCwsLCwsLS8sLCwsLCwsLP/AABEIAOEA4QMBIgACEQEDEQH/xAAcAAEAAgMBAQEAAAAAAAAAAAAAAwQCBQYBBwj/xABCEAABAgIECwQIBQQBBQAAAAABAAIDEQQSITEFIkFRYXGBkaGxwQYyUmITFEJygtHh8COSosLxBzNTsiQVQ2PS8v/EABoBAQACAwEAAAAAAAAAAAAAAAABBQIDBAb/xAAzEQACAQMACQMCBQQDAAAAAAAAAQIDBBESFSExQVFSkfAFE4EUoSJCYXGxI8HR8TIzQ//aAAwDAQACEQMRAD8A+4oiIAiIgCIiAIiIAiIgCIiAIiIAiIgCIiAIixfEAEyQBnJACAyRRsigiYcHDOCCOCzBQHqIiAIiIAiIgCIiAIiIAiIgCIiAIiIAiIgCIiAIiIAiIgCItX2kwn6vR4kQSrASYDle4ybZrM9QKmMXJpIiUlFNvcjnu2fa8wXGBRyPSj+5EkHCFMWNaDYX3G2wacnzqlxXRXVor3RXZ3uLzsndsWbiSSSS5ziS4m0uJMy46SSSsAF6CjQhSjhb+Z5ivdTrSbe7gjKhRHQnVoT3QnDKwlp25CNBsX0DsR2x9ZnCiyEeGJkixsVs5VwMhmRMaRnkPnsZ1VjnaJBazsnTSynQXAm11U6Q4FsjvB2LVdUozg3xR0WNaUJpZ2M/RbHTWSpYOizAV1UZ6AIiIAiIgCIiAIiIAiIgCIiAIiIAiIgCIiAIiIAiIgPCvnf9RsI14jIANkIV3+84SaNjZn413tOpLYbHPcZNY0uccwAmV8apdJdFiPiO70RxcdE7m7BIbF3+n0tKppPh/JWeqVtCloLfL+Cq4L1rFlVUj3iGwxDksbpKuJFDE0/aKkyAhjJfrUXYyil9LYckObjukOJG5aulRS5xJyr6P/TzAZY2s4Y8SROgZG/edcV3U0KeOLLSxpaU0+C2n0nBDZNC2KgosOQU6pS9CIiAIiIAiIgCIiAIiIAiIgCIiAIiIAiIgCIiAIijjxJCZsQHIf1CwjKG2CDbFM3aGNIPF0tgK4IhbHDNO9PGfF9k2M0Mb3d9rviVIBeitaPtUknv3s8pfXHvVm1uWxHsCCXEAXlc/wBpsIh76jD+HDsHmOVy3WHKd6vAsMo1ImG52M9p3Qa9C4yjwjEeGtE3OMh80nNZ/YmhSbWeZuuyeCTHigkYjDsLsg67l9uwHQKjRYuc7GYDENjQBdlyk5Su7gskFR16rqTz2PR29FUoaPczAXqItJvCIiAIiIAiIgCIiAIiIAiIgCIiALyaErge0Pal8R5ZR31ITbDEb34hy1TkbpFpW6hQnWloxOe5uadvDSn/ALO+rLyuvj0R7j3oj3HOXvceJUZB8R3lWGqpdX2KrXkOh9z7J6ReelC+Nhuk7ysg3Sd5UarfV9hryHQ+59cpFOYwTc4NGdxDRvK4ztR2mERphQTWD7HvubVytbnndO6XDkqQ5jAXvkA28m06lrjS4zwXMaIUMZXSc+QtmZ2DittKwjCWZPJrq+qVK0XGC0Vzb/g2RCQ71r6P6Y3RK+hzWAbxJWocSYnpIInWAIvE8q79LJVOm48Tnu25caQX2+jqMDDkADbW6DWrb1t+wODRP0jrS7u6B9VNFE1W9CBcJcFyVrZzjhPBZW15Gm05Rzg+yYOiNa0K9661fDHTzneVE4nxHeVxP099X2LBepxf5fufePXWr0Uxq+CTPiO8qajggOeXODWDxG05Fi7B9X2Ml6jHpPvLIwKlXxTsd25iMiiDHcXw3mTHuJL2E3Nc494HObRqu+w0KkVguSpTcHhndSqxqRyi0iItZsCIiAIiIAiIgCIiALwlernu1/aAUWHJsjHiTENubO86BxMgsoQc5KKMZzjCLlLcjV9t8PynRoRxiPxXD2Wkf2xpOXMNa49lirMcSSSS5ziS4m0uJtJKlD16O2oqjDRXyeQvbiVxU0nu4ExKxUddeV1vyceiSpNRV15XUZJ0SjhNpfEY28AVpeJxMhut3q56Gt6SC2WLDkTkrxAbNgAPxLCK2ZBBqubcRkVf1Z0nAPMonfNcgvnZab1qlk7KbjopPgWHRw2C50O6dSGf8j5yLxnaDPYw6FHRIVVgGTJqFk+a9FH7oc4uEPusBNRtkuRO9ZvcpinxInKOMIxco3LJxUbipZiiNyjIUjl5JYNG1MjDJ2C8r3tG/wBGxsEXyrP1m4LaYGo4mYru5CE9ZXJYZpRiRHOPtFaZs301kowIZc4AXkyGs3L9DdmXGo2dpkJ6V8X7HUD0kYGVjLdpsHXcvumBKPVaFV3Utqj5tLuzj+Fy5/2NqiIuQ7AiIgCIiAIiIAiKCl0lsNpc4ya28/eVG8AwwhTGwob4jp1YbXOdITMmgkyGU2L4ZhKmU6lRnxzDZDDu615thsE5N0StndbNd1h3DL41gm1hMmNznK92eW65a1lDEg3Ib/dHeO2wbQuF+qSpv+kvlm+VhGqv6vY5BkCmyBlCtFgN/drfetHwqcAZiFZvuB6gLtWwRNznXNHyceFUKsIBdKYtM3HYbB+Y8FGvLrmvPk16mtOXnY5P0VOkTKFZLi6qJIIdOssg29Z9Gz1SXWuhC7ILSdkgdwJUUeFIGy0CR0FwBcNjQ1qa8uua8+Rqa06fOxyo9dq16sKU5aZ/yQNZWUSHTmgktg2T1zEpjXMy1hdaaPVDRKfom1yM7jY0bXE7gsIsKTmtv9GKztJF29xnsUa8uua8+Rqa15edjlHCnAkVYJInPNYQJbyjjTgJygSkDscSAeBOpdGyBMSyxHSnoBIB313fCF7Eh1y0C57q3wDFb+lp3qddXPNefJOprXl52OclT/DAumbsUabVh/z/AAQO7WuFgkDvtAXVllaz/K+XwNv5O3pEZOufEQ3Z3ncLNix13dc158k6nteXnY5IGn5GQTZO4ZwJX328CvXingyqQLSBYBlJHQnUunojJzOcn9I/9is/QTiAZjIcGT5lTrq55rz5GqLXl52OVeKcL2QcmRuUT5S3hYOjU0WVYO5uQTPyXW0oC05CeBdL/Vi1lJhyDibw0b3mZ4LOPrFw+XnyRqm25edjQx8L0wQy0thFlswGjJKZv0rTMj1zdI5RbLZNdDShJv5eJrnhVWpwTg8x6TVYCWzxzIyF1e3XNWVlfTqtqfDacV5YwppOnvew+i/08wXJgcRa/G2ZOEt6+p0ZkgtB2boFRosXRhYTk5SbZvhFRiorgeoiLEyCIiAIiIAiIUBi90lwmGsJmkOxT+EDKH5shinXbLRM5Vt+1lPnKA0yricUj2Yfh1uMxqBXNRGTxRZWs1NHe4Yu0qsva/8A5r5Ou3p/mZHRYNcgi44rPdF7tvUK5GlMj2RZ8LLXHa6z4VLAEgXAXCTBwbvJ5KvVnYLZkMGptpO0/wCyq85Z1Hj4ZLWtyxHW6pzPFevaMY5Jho1N+3FWXWOc4f8AbbVbpcVDEh91mRot2/TmoJyVpSEyL8YjQJSG+qN6QqPa0G/vO1zmeMlZZDru0Tt91v1mVJDbOsfGao0DL13KGxkrFs5eY1z7rbGDkVSkS0uHeiuk3ULG9XK9SzMGV8Q1W6GiznNDDxpC6GJDWbBuE96InJRiQ7ZNskA1vxYjTsaHO+JehtsRwySYzXYB0U8IW1sgBdvxWcAVmGVQwH2QYjt1g48FL5DJBBhgPcfZgsqjXl4DioqQKrLbw0uPvPM+U1agQ/whnjPt1E2/pBUGEhWIH+SJLY2zoU4g8ocKTRPIGz1yMR3RIDZOJytBO2XzKtQmzb70z+ZwA4BYUYWvOcjmT0UkNmtp7e63OZcAzq5VsMNyC98Q7gJDmrrmTjMGYA/7O+Sr4VEozR4Wk/e5bIvcDncItm5rR7TnEap1BwC+gdkcBtaBJoAvsHFcTQ4Nakwx4WA7xP8AcF9hwBAk0K5s1iGThuHmWDZ0aDVCnRF1HOEREAREQBERAFXptJENjnuMmsBJ1BTlc52mpFYthTs78T3WnFB1m34VrrVFTg5GUI6UsGiL3OLnu/uRTWIyNnYxmoAfpWEJmUXuxW55eLmVnEmdBcZDRMW7m2aypmttMvZEm6zYOp2rz0m3tZZLYePsbMZLR/q3nwUVFEiTkhNltNp58FLTyBJuQWnU0fyvIEObWtPtms7ULStYPWM7oOl7unPgogbC7K42bbB0UxtmfGZDUL+qii3gDJzuHGtuCIkkY2rDJyvsGr75rNwqiy9okPed98Vm5uM1uRgn98NyxiG7RN55NUEFaGycTywm8Vg5uITleZ77BwU1HZ+GT7UV3My+azitmWjJadgsCkkhbBsl4iBsH2VXpxmHS9twYNQv4krZmy3wNJ++KothziQ2+EVjrNqLeCZ7AHNGSGwnoOTlq6QPxGj/ABw5/E7+VuIjZ+k0kMHAHiSta1taNEPma3cZ8gpiSWwyUh4QBuaT1CggNk063cGy6q44X7f2hV4TcQaax3uAQgowWfjnQAP0gKhhkfjRfKyXNbeit/FefN+4LV4Vb+LH3cFnHeCngOFOlHQ1o4D5L65gpkmhfLezrf8Akv2L6tg8YoV9bf8AVEr63/NlpERbzUEREAREQBERAYRXSC4ukRK7nPv9K6Q9xt28De5dHh2NVhuAvdij4rJ7BM7FzdJeGNc7IxtVuu/5blWeoVN0Pk6reO9kMO1zj4MUaXG1x3y3KxAHd2vPJnAKKjQSGNblImfecb+J3Kw0945CZD3W2dDvVWzpNfScZ8tQ6lW5ya52fEbzPRU4Btc4+zzNp6K89sqjfAKztZtPPgoZJ5VkPdAaNZtPTeoKO2bhpPAWA9VPSDJozyrbXWDmNyjojZBzhkAaNZs+aEE8NsyT4jIaAPsqvS3TDpe2ao1CzmrrRIHyiQ1n74qs1uO0ZGCe3+ZLFEkpZIgC6G0nb3RxJWDWYzvKA373qeE2czncBsaLeKihnFn43F2zJzUkGMcTBHjcG7MvVRUBtaK92QGW7+FKT3fK1zz05lYUAShPdlId8gnAkzhjEafE4uO5zuoWtwa2dvieTuEltqS2TR5WO4yA5LX0Bkmt1OO8qVuBOMv37R+SjhtxWe7+9SsuOroT1XhEgz3W8ygKtFGM73v3Ba7CLMeN95FtaOMZ+s8wqeEIeNF0/JSt5JrcAWUh2mX3xX1TBxxQvlODzVjA5yOX0X1HBD5tCvrSWaSOCusTNgiIuk0hERAEREAXhXqxiGxAaHDMSb2jI2bjyHNy0OEMZ0OHnNZ3P5LbUx1aI/WG7AJnmVqKM6tFc7Nd97lQXU9KrJ/HY76KxFFx7qoLs0yNYEmje7go4mKwjI1oH15qSPe1ucieporH9TmqrTTNkssR8uh6rmNhjRYcwwH2zM6r+StDGcT4zLZeVHDvJyNEgp4dnwt4n6BAQUx9usk7G2Di7gpoLJMYM83nkPmq8Zs3SzSbtvP6nHcrkQTJAzhg1Cz5owenujzGsenRV4B7zjn4ATPRWqUb8wsCrMbitHiI4mZ4KECZ4qw9NXi4y6hRUiwAZgBv/lWaZe1udw3NE+clUiOm4aXT2D7CngEY0h0hEOYNaOZ5qZkOUJrc5aOMzyVWJawf+R5OyfyWweO4NJO5sv3ICLCNzvdaOJKpwRIDQwc1Zwke/rA3NCrZ9QCcCUTQxin3f2hYUmwM1N5qRgsd7vRQYSMg3Q0c0Ao7cZ/xcpqGmsxnaW/NW6M3HOnq0qOlC45x1QHNSlbmIO5fROzsabQuBiQ+8F0vY+lzaATaLDssVvYT2OPyctytzO2ReNNi9VicoREQBERAFFSDYpVUwg+TScwKA5mM/Ec7OXHeZDgqmCocx7x5lSYRdVhgZ5cvmVlQhJhN0geNg5rzE5ZbZZpYQrzc5xuA3Tx3cCNyrRe8wH2Wlx1n6zUotafP+8yluPBRRjN79JDBssPFQSieAMUeYzU8G203OdM6h9AonG+WQSG1TluKRoDR8RDeU0IZXo14cck3nnzIVijCUifZaXHWf5KhPtaSG7LyrT7Ge+4DZO3gCoBXphxQMp6rOjWxGjwgnoOqjpJm4aDyH1UuDb3u1AbB804A8pb8afgYTtcZdAqTnSJ8rfvkp6S6Zd5nhuxot4tKqzmTpIHFSSiyGY0JvhE+CvAY7dA5ul+1VoQnF91vNWYPf3dT1RmJrMNxqrIjs1Y7liMuxVO1Z/AiSyg8SrFEfWaD4pHeAstH8Cf6/wCCU9uC60d/V0Cp4VPd9xXf8n37LVrsIutGhoUEovUXvA56pUdMbiyzVgs6H3WHyD9JXlOMq2h4/V/Kgg0hE3HSvcB0n0cYtNzrRryrx9gn4TyKrYQbaHsOlp0gyI2EEFddvU9uaZhUjpRwfU6FGrNCsrk+y+Fg9ot1jMcoXVMdNXiedqK/cZIiKQEREAWuwwcR2kS32LYrWYX7p+8qwqPEH+zJjvRx+HomTNLnPorr7IcvEQOZ6Ba+ksrudo++itxImI3ytmdZAHQqgqU8UYS5t+fYsFL8bj+xnBNrc1Yu2NB+aqUMzkT5nnWbBxIU77Gu8sMja6zqooeKwnPJu4TPFaDYixBtOsz3K626eQEn8oq8zNU6LYJ5h9VajWQtLgBvvUMgghixuczdtcbOE1YpJx2N8IJ4AD/YrGG2bwM3IfVQRIk4rz4WgbyT8lGQIpy/dp+isYOshTzklVKbY0albIlCl5ef8qUHuKbzYzSHOOs/yq9FtI0manppkdTQOar0G8KWStxsqL3nnSOSmoxxtvJqgoeXSSs6Kcuk8ioyYmm7QicF+rqvcAGcJudtm67hJZYVE2OGg8ljgVtWYNzgCNY+nJdtOGnby/R5NcpYqL9UbaKJV9I/aPktTSrT8K2tOdI6x0K1d7hpB5LlNsS9g84jNbhvt6LDCVz9LA7aP/lY0B2L7r2nYbDzVilstbpD29RzWOdoNE60vGe0bQtVR3kOew2teQ9vlcWiY1Ou1yOdX/SBpbM3tlpmNCt4LwYXzJF92pWNpSc201saNFaeMY3mlo9NdR3122tPebnGcaV9L7P4VbGYHNcHA8NBzHQuTj9mSXG3ENsss8tuZdRgDBwhNDWtDQMgEgrC3hOCxLcc9WUZbUb8L1eBeroNQREQBUsIQK7SM6urwhQ0msMLYc1BwPVnbOeeSqU7Bb7ap6/d666oEMILD2YaKi1sRlpyznJwUShxyHCYk6U8UZJS5LF1BjkAEiQn7IyrvPV25k9XbmWP01LpXYn3J8zhvVI8pTEj5QpIkKkGQLhimYxRkXa+rtzJ6u3Mo+mpdK7D3J8zimwqQDMFsz5QovVI8yZibpTxRkXdertzJ6u3Mn01HpXYe5PmcLGolIdeR+ULMwqT4m/lGRdv6u3Mnq7cyfTUeldh7k+ZwUSg0h05uFvlC8hYPjtuI/KF33q7cyertzKfpqXSuw9yfM4eHApIuc38oRsCkiWMLPKMv8ruPV25k9XbmUfTUeldh7kuZxMHB0VxxzPZJbP/AKTJoleLl0ggDMsvRhZxpQimksZIc5Pezh8IwIznWBolod81TZQI8wZgS8q+gmjNzLwUVuZYfTUulGXuz5nBswfSJEB8gb8VvUKY4OpDpVorrDOwMFspTsC7gUduZeiCMyyVCkvyrsY6cuZx1B7NAGZEznNpXSUPB4aLlfDQsltMSH0AzLNrAFmiAIiIAiIgCIiAIiIAiIgCIiAIiIAiIgCIiAIiIAiIgCIiAIiIAiIgCIiAIiIAiIgP/9k="/>
+          <p:cNvSpPr>
+            <a:spLocks noChangeAspect="1" noChangeArrowheads="1"/>
+          </p:cNvSpPr>
+          <p:nvPr/>
+        </p:nvSpPr>
+        <p:spPr bwMode="auto">
+          <a:xfrm>
+            <a:off x="155575" y="-144463"/>
+            <a:ext cx="304800" cy="304801"/>
+          </a:xfrm>
+          <a:prstGeom prst="rect">
+            <a:avLst/>
+          </a:prstGeom>
+          <a:noFill/>
+          <a:extLst>
+            <a:ext uri="{909E8E84-426E-40DD-AFC4-6F175D3DCCD1}">
+              <a14:hiddenFill xmlns:a14="http://schemas.microsoft.com/office/drawing/2010/main">
+                <a:solidFill>
+                  <a:srgbClr val="FFFFFF"/>
+                </a:solidFill>
+              </a14:hiddenFill>
+            </a:ext>
+          </a:extLst>
+        </p:spPr>
+        <p:txBody>
+          <a:bodyPr vert="horz" wrap="square" lIns="91440" tIns="45720" rIns="91440" bIns="45720" numCol="1" anchor="t" anchorCtr="0" compatLnSpc="1">
+            <a:prstTxWarp prst="textNoShape">
+              <a:avLst/>
+            </a:prstTxWarp>
+          </a:bodyPr>
+          <a:lstStyle/>
+          <a:p>
+            <a:endParaRPr lang="en-US"/>
+          </a:p>
+        </p:txBody>
+      </p:sp>
+      <p:sp>
+        <p:nvSpPr>
+          <p:cNvPr id="77" name="AutoShape 17" descr="data:image/jpeg;base64,/9j/4AAQSkZJRgABAQAAAQABAAD/2wCEAAkGBxQTEhUUEhAUEBEQFhgYFBQVFA8PDxAXFxQXFxYSFBQYHCggGBolHBQVITEhJSkrLi4uFx8zODMsNygtLisBCgoKDg0OGhAQGiwkICQsLCwsNiwsOC0sLCwsLCwsLiwsNSwvNywsLCwsLCw0LC8tLCwsLCwsLS8sLCwsLCwsLP/AABEIAOEA4QMBIgACEQEDEQH/xAAcAAEAAgMBAQEAAAAAAAAAAAAAAwQCBQYBBwj/xABCEAABAgIECwQIBQQBBQAAAAABAAIDEQQSITEFIkFRYXGBkaGxwQYyUmITFEJygtHh8COSosLxBzNTsiQVQ2PS8v/EABoBAQACAwEAAAAAAAAAAAAAAAABBQIDBAb/xAAzEQACAQMACQMCBQQDAAAAAAAAAQIDBBESFSExQVFSkfAFE4EUoSJCYXGxI8HR8TIzQ//aAAwDAQACEQMRAD8A+4oiIAiIgCIiAIiIAiIgCIiAIiIAiIgCIiAIixfEAEyQBnJACAyRRsigiYcHDOCCOCzBQHqIiAIiIAiIgCIiAIiIAiIgCIiAIiIAiIgCIiAIiIAiIgCItX2kwn6vR4kQSrASYDle4ybZrM9QKmMXJpIiUlFNvcjnu2fa8wXGBRyPSj+5EkHCFMWNaDYX3G2wacnzqlxXRXVor3RXZ3uLzsndsWbiSSSS5ziS4m0uJMy46SSSsAF6CjQhSjhb+Z5ivdTrSbe7gjKhRHQnVoT3QnDKwlp25CNBsX0DsR2x9ZnCiyEeGJkixsVs5VwMhmRMaRnkPnsZ1VjnaJBazsnTSynQXAm11U6Q4FsjvB2LVdUozg3xR0WNaUJpZ2M/RbHTWSpYOizAV1UZ6AIiIAiIgCIiAIiIAiIgCIiAIiIAiIgCIiAIiIAiIgPCvnf9RsI14jIANkIV3+84SaNjZn413tOpLYbHPcZNY0uccwAmV8apdJdFiPiO70RxcdE7m7BIbF3+n0tKppPh/JWeqVtCloLfL+Cq4L1rFlVUj3iGwxDksbpKuJFDE0/aKkyAhjJfrUXYyil9LYckObjukOJG5aulRS5xJyr6P/TzAZY2s4Y8SROgZG/edcV3U0KeOLLSxpaU0+C2n0nBDZNC2KgosOQU6pS9CIiAIiIAiIgCIiAIiIAiIgCIiAIiIAiIgCIiAIijjxJCZsQHIf1CwjKG2CDbFM3aGNIPF0tgK4IhbHDNO9PGfF9k2M0Mb3d9rviVIBeitaPtUknv3s8pfXHvVm1uWxHsCCXEAXlc/wBpsIh76jD+HDsHmOVy3WHKd6vAsMo1ImG52M9p3Qa9C4yjwjEeGtE3OMh80nNZ/YmhSbWeZuuyeCTHigkYjDsLsg67l9uwHQKjRYuc7GYDENjQBdlyk5Su7gskFR16rqTz2PR29FUoaPczAXqItJvCIiAIiIAiIgCIiAIiIAiIgCIiALyaErge0Pal8R5ZR31ITbDEb34hy1TkbpFpW6hQnWloxOe5uadvDSn/ALO+rLyuvj0R7j3oj3HOXvceJUZB8R3lWGqpdX2KrXkOh9z7J6ReelC+Nhuk7ysg3Sd5UarfV9hryHQ+59cpFOYwTc4NGdxDRvK4ztR2mERphQTWD7HvubVytbnndO6XDkqQ5jAXvkA28m06lrjS4zwXMaIUMZXSc+QtmZ2DittKwjCWZPJrq+qVK0XGC0Vzb/g2RCQ71r6P6Y3RK+hzWAbxJWocSYnpIInWAIvE8q79LJVOm48Tnu25caQX2+jqMDDkADbW6DWrb1t+wODRP0jrS7u6B9VNFE1W9CBcJcFyVrZzjhPBZW15Gm05Rzg+yYOiNa0K9661fDHTzneVE4nxHeVxP099X2LBepxf5fufePXWr0Uxq+CTPiO8qajggOeXODWDxG05Fi7B9X2Ml6jHpPvLIwKlXxTsd25iMiiDHcXw3mTHuJL2E3Nc494HObRqu+w0KkVguSpTcHhndSqxqRyi0iItZsCIiAIiIAiIgCIiALwlernu1/aAUWHJsjHiTENubO86BxMgsoQc5KKMZzjCLlLcjV9t8PynRoRxiPxXD2Wkf2xpOXMNa49lirMcSSSS5ziS4m0uJtJKlD16O2oqjDRXyeQvbiVxU0nu4ExKxUddeV1vyceiSpNRV15XUZJ0SjhNpfEY28AVpeJxMhut3q56Gt6SC2WLDkTkrxAbNgAPxLCK2ZBBqubcRkVf1Z0nAPMonfNcgvnZab1qlk7KbjopPgWHRw2C50O6dSGf8j5yLxnaDPYw6FHRIVVgGTJqFk+a9FH7oc4uEPusBNRtkuRO9ZvcpinxInKOMIxco3LJxUbipZiiNyjIUjl5JYNG1MjDJ2C8r3tG/wBGxsEXyrP1m4LaYGo4mYru5CE9ZXJYZpRiRHOPtFaZs301kowIZc4AXkyGs3L9DdmXGo2dpkJ6V8X7HUD0kYGVjLdpsHXcvumBKPVaFV3Utqj5tLuzj+Fy5/2NqiIuQ7AiIgCIiAIiIAiKCl0lsNpc4ya28/eVG8AwwhTGwob4jp1YbXOdITMmgkyGU2L4ZhKmU6lRnxzDZDDu615thsE5N0StndbNd1h3DL41gm1hMmNznK92eW65a1lDEg3Ib/dHeO2wbQuF+qSpv+kvlm+VhGqv6vY5BkCmyBlCtFgN/drfetHwqcAZiFZvuB6gLtWwRNznXNHyceFUKsIBdKYtM3HYbB+Y8FGvLrmvPk16mtOXnY5P0VOkTKFZLi6qJIIdOssg29Z9Gz1SXWuhC7ILSdkgdwJUUeFIGy0CR0FwBcNjQ1qa8uua8+Rqa06fOxyo9dq16sKU5aZ/yQNZWUSHTmgktg2T1zEpjXMy1hdaaPVDRKfom1yM7jY0bXE7gsIsKTmtv9GKztJF29xnsUa8uua8+Rqa15edjlHCnAkVYJInPNYQJbyjjTgJygSkDscSAeBOpdGyBMSyxHSnoBIB313fCF7Eh1y0C57q3wDFb+lp3qddXPNefJOprXl52OclT/DAumbsUabVh/z/AAQO7WuFgkDvtAXVllaz/K+XwNv5O3pEZOufEQ3Z3ncLNix13dc158k6nteXnY5IGn5GQTZO4ZwJX328CvXingyqQLSBYBlJHQnUunojJzOcn9I/9is/QTiAZjIcGT5lTrq55rz5GqLXl52OVeKcL2QcmRuUT5S3hYOjU0WVYO5uQTPyXW0oC05CeBdL/Vi1lJhyDibw0b3mZ4LOPrFw+XnyRqm25edjQx8L0wQy0thFlswGjJKZv0rTMj1zdI5RbLZNdDShJv5eJrnhVWpwTg8x6TVYCWzxzIyF1e3XNWVlfTqtqfDacV5YwppOnvew+i/08wXJgcRa/G2ZOEt6+p0ZkgtB2boFRosXRhYTk5SbZvhFRiorgeoiLEyCIiAIiIAiIUBi90lwmGsJmkOxT+EDKH5shinXbLRM5Vt+1lPnKA0yricUj2Yfh1uMxqBXNRGTxRZWs1NHe4Yu0qsva/8A5r5Ou3p/mZHRYNcgi44rPdF7tvUK5GlMj2RZ8LLXHa6z4VLAEgXAXCTBwbvJ5KvVnYLZkMGptpO0/wCyq85Z1Hj4ZLWtyxHW6pzPFevaMY5Jho1N+3FWXWOc4f8AbbVbpcVDEh91mRot2/TmoJyVpSEyL8YjQJSG+qN6QqPa0G/vO1zmeMlZZDru0Tt91v1mVJDbOsfGao0DL13KGxkrFs5eY1z7rbGDkVSkS0uHeiuk3ULG9XK9SzMGV8Q1W6GiznNDDxpC6GJDWbBuE96InJRiQ7ZNskA1vxYjTsaHO+JehtsRwySYzXYB0U8IW1sgBdvxWcAVmGVQwH2QYjt1g48FL5DJBBhgPcfZgsqjXl4DioqQKrLbw0uPvPM+U1agQ/whnjPt1E2/pBUGEhWIH+SJLY2zoU4g8ocKTRPIGz1yMR3RIDZOJytBO2XzKtQmzb70z+ZwA4BYUYWvOcjmT0UkNmtp7e63OZcAzq5VsMNyC98Q7gJDmrrmTjMGYA/7O+Sr4VEozR4Wk/e5bIvcDncItm5rR7TnEap1BwC+gdkcBtaBJoAvsHFcTQ4Nakwx4WA7xP8AcF9hwBAk0K5s1iGThuHmWDZ0aDVCnRF1HOEREAREQBERAFXptJENjnuMmsBJ1BTlc52mpFYthTs78T3WnFB1m34VrrVFTg5GUI6UsGiL3OLnu/uRTWIyNnYxmoAfpWEJmUXuxW55eLmVnEmdBcZDRMW7m2aypmttMvZEm6zYOp2rz0m3tZZLYePsbMZLR/q3nwUVFEiTkhNltNp58FLTyBJuQWnU0fyvIEObWtPtms7ULStYPWM7oOl7unPgogbC7K42bbB0UxtmfGZDUL+qii3gDJzuHGtuCIkkY2rDJyvsGr75rNwqiy9okPed98Vm5uM1uRgn98NyxiG7RN55NUEFaGycTywm8Vg5uITleZ77BwU1HZ+GT7UV3My+azitmWjJadgsCkkhbBsl4iBsH2VXpxmHS9twYNQv4krZmy3wNJ++KothziQ2+EVjrNqLeCZ7AHNGSGwnoOTlq6QPxGj/ABw5/E7+VuIjZ+k0kMHAHiSta1taNEPma3cZ8gpiSWwyUh4QBuaT1CggNk063cGy6q44X7f2hV4TcQaax3uAQgowWfjnQAP0gKhhkfjRfKyXNbeit/FefN+4LV4Vb+LH3cFnHeCngOFOlHQ1o4D5L65gpkmhfLezrf8Akv2L6tg8YoV9bf8AVEr63/NlpERbzUEREAREQBERAYRXSC4ukRK7nPv9K6Q9xt28De5dHh2NVhuAvdij4rJ7BM7FzdJeGNc7IxtVuu/5blWeoVN0Pk6reO9kMO1zj4MUaXG1x3y3KxAHd2vPJnAKKjQSGNblImfecb+J3Kw0945CZD3W2dDvVWzpNfScZ8tQ6lW5ya52fEbzPRU4Btc4+zzNp6K89sqjfAKztZtPPgoZJ5VkPdAaNZtPTeoKO2bhpPAWA9VPSDJozyrbXWDmNyjojZBzhkAaNZs+aEE8NsyT4jIaAPsqvS3TDpe2ao1CzmrrRIHyiQ1n74qs1uO0ZGCe3+ZLFEkpZIgC6G0nb3RxJWDWYzvKA373qeE2czncBsaLeKihnFn43F2zJzUkGMcTBHjcG7MvVRUBtaK92QGW7+FKT3fK1zz05lYUAShPdlId8gnAkzhjEafE4uO5zuoWtwa2dvieTuEltqS2TR5WO4yA5LX0Bkmt1OO8qVuBOMv37R+SjhtxWe7+9SsuOroT1XhEgz3W8ygKtFGM73v3Ba7CLMeN95FtaOMZ+s8wqeEIeNF0/JSt5JrcAWUh2mX3xX1TBxxQvlODzVjA5yOX0X1HBD5tCvrSWaSOCusTNgiIuk0hERAEREAXhXqxiGxAaHDMSb2jI2bjyHNy0OEMZ0OHnNZ3P5LbUx1aI/WG7AJnmVqKM6tFc7Nd97lQXU9KrJ/HY76KxFFx7qoLs0yNYEmje7go4mKwjI1oH15qSPe1ucieporH9TmqrTTNkssR8uh6rmNhjRYcwwH2zM6r+StDGcT4zLZeVHDvJyNEgp4dnwt4n6BAQUx9usk7G2Di7gpoLJMYM83nkPmq8Zs3SzSbtvP6nHcrkQTJAzhg1Cz5owenujzGsenRV4B7zjn4ATPRWqUb8wsCrMbitHiI4mZ4KECZ4qw9NXi4y6hRUiwAZgBv/lWaZe1udw3NE+clUiOm4aXT2D7CngEY0h0hEOYNaOZ5qZkOUJrc5aOMzyVWJawf+R5OyfyWweO4NJO5sv3ICLCNzvdaOJKpwRIDQwc1Zwke/rA3NCrZ9QCcCUTQxin3f2hYUmwM1N5qRgsd7vRQYSMg3Q0c0Ao7cZ/xcpqGmsxnaW/NW6M3HOnq0qOlC45x1QHNSlbmIO5fROzsabQuBiQ+8F0vY+lzaATaLDssVvYT2OPyctytzO2ReNNi9VicoREQBERAFFSDYpVUwg+TScwKA5mM/Ec7OXHeZDgqmCocx7x5lSYRdVhgZ5cvmVlQhJhN0geNg5rzE5ZbZZpYQrzc5xuA3Tx3cCNyrRe8wH2Wlx1n6zUotafP+8yluPBRRjN79JDBssPFQSieAMUeYzU8G203OdM6h9AonG+WQSG1TluKRoDR8RDeU0IZXo14cck3nnzIVijCUifZaXHWf5KhPtaSG7LyrT7Ge+4DZO3gCoBXphxQMp6rOjWxGjwgnoOqjpJm4aDyH1UuDb3u1AbB804A8pb8afgYTtcZdAqTnSJ8rfvkp6S6Zd5nhuxot4tKqzmTpIHFSSiyGY0JvhE+CvAY7dA5ul+1VoQnF91vNWYPf3dT1RmJrMNxqrIjs1Y7liMuxVO1Z/AiSyg8SrFEfWaD4pHeAstH8Cf6/wCCU9uC60d/V0Cp4VPd9xXf8n37LVrsIutGhoUEovUXvA56pUdMbiyzVgs6H3WHyD9JXlOMq2h4/V/Kgg0hE3HSvcB0n0cYtNzrRryrx9gn4TyKrYQbaHsOlp0gyI2EEFddvU9uaZhUjpRwfU6FGrNCsrk+y+Fg9ot1jMcoXVMdNXiedqK/cZIiKQEREAWuwwcR2kS32LYrWYX7p+8qwqPEH+zJjvRx+HomTNLnPorr7IcvEQOZ6Ba+ksrudo++itxImI3ytmdZAHQqgqU8UYS5t+fYsFL8bj+xnBNrc1Yu2NB+aqUMzkT5nnWbBxIU77Gu8sMja6zqooeKwnPJu4TPFaDYixBtOsz3K626eQEn8oq8zNU6LYJ5h9VajWQtLgBvvUMgghixuczdtcbOE1YpJx2N8IJ4AD/YrGG2bwM3IfVQRIk4rz4WgbyT8lGQIpy/dp+isYOshTzklVKbY0albIlCl5ef8qUHuKbzYzSHOOs/yq9FtI0manppkdTQOar0G8KWStxsqL3nnSOSmoxxtvJqgoeXSSs6Kcuk8ioyYmm7QicF+rqvcAGcJudtm67hJZYVE2OGg8ljgVtWYNzgCNY+nJdtOGnby/R5NcpYqL9UbaKJV9I/aPktTSrT8K2tOdI6x0K1d7hpB5LlNsS9g84jNbhvt6LDCVz9LA7aP/lY0B2L7r2nYbDzVilstbpD29RzWOdoNE60vGe0bQtVR3kOew2teQ9vlcWiY1Ou1yOdX/SBpbM3tlpmNCt4LwYXzJF92pWNpSc201saNFaeMY3mlo9NdR3122tPebnGcaV9L7P4VbGYHNcHA8NBzHQuTj9mSXG3ENsss8tuZdRgDBwhNDWtDQMgEgrC3hOCxLcc9WUZbUb8L1eBeroNQREQBUsIQK7SM6urwhQ0msMLYc1BwPVnbOeeSqU7Bb7ap6/d666oEMILD2YaKi1sRlpyznJwUShxyHCYk6U8UZJS5LF1BjkAEiQn7IyrvPV25k9XbmWP01LpXYn3J8zhvVI8pTEj5QpIkKkGQLhimYxRkXa+rtzJ6u3Mo+mpdK7D3J8zimwqQDMFsz5QovVI8yZibpTxRkXdertzJ6u3Mn01HpXYe5PmcLGolIdeR+ULMwqT4m/lGRdv6u3Mnq7cyfTUeldh7k+ZwUSg0h05uFvlC8hYPjtuI/KF33q7cyertzKfpqXSuw9yfM4eHApIuc38oRsCkiWMLPKMv8ruPV25k9XbmUfTUeldh7kuZxMHB0VxxzPZJbP/AKTJoleLl0ggDMsvRhZxpQimksZIc5Pezh8IwIznWBolod81TZQI8wZgS8q+gmjNzLwUVuZYfTUulGXuz5nBswfSJEB8gb8VvUKY4OpDpVorrDOwMFspTsC7gUduZeiCMyyVCkvyrsY6cuZx1B7NAGZEznNpXSUPB4aLlfDQsltMSH0AzLNrAFmiAIiIAiIgCIiAIiIAiIgCIiAIiIAiIgCIiAIiIAiIgCIiAIiIAiIgCIiAIiIAiIgP/9k="/>
+          <p:cNvSpPr>
+            <a:spLocks noChangeAspect="1" noChangeArrowheads="1"/>
+          </p:cNvSpPr>
+          <p:nvPr/>
+        </p:nvSpPr>
+        <p:spPr bwMode="auto">
+          <a:xfrm>
+            <a:off x="307975" y="7937"/>
+            <a:ext cx="304800" cy="304801"/>
+          </a:xfrm>
+          <a:prstGeom prst="rect">
+            <a:avLst/>
+          </a:prstGeom>
+          <a:noFill/>
+          <a:extLst>
+            <a:ext uri="{909E8E84-426E-40DD-AFC4-6F175D3DCCD1}">
+              <a14:hiddenFill xmlns:a14="http://schemas.microsoft.com/office/drawing/2010/main">
+                <a:solidFill>
+                  <a:srgbClr val="FFFFFF"/>
+                </a:solidFill>
+              </a14:hiddenFill>
+            </a:ext>
+          </a:extLst>
+        </p:spPr>
+        <p:txBody>
+          <a:bodyPr vert="horz" wrap="square" lIns="91440" tIns="45720" rIns="91440" bIns="45720" numCol="1" anchor="t" anchorCtr="0" compatLnSpc="1">
+            <a:prstTxWarp prst="textNoShape">
+              <a:avLst/>
+            </a:prstTxWarp>
+          </a:bodyPr>
+          <a:lstStyle/>
+          <a:p>
+            <a:endParaRPr lang="en-US"/>
+          </a:p>
+        </p:txBody>
+      </p:sp>
+      <p:grpSp>
+        <p:nvGrpSpPr>
+          <p:cNvPr id="79" name="Gruppo 78"/>
+          <p:cNvGrpSpPr/>
+          <p:nvPr/>
+        </p:nvGrpSpPr>
+        <p:grpSpPr>
+          <a:xfrm>
+            <a:off x="6154113" y="332656"/>
+            <a:ext cx="1260000" cy="1275544"/>
+            <a:chOff x="6154113" y="332656"/>
+            <a:chExt cx="1260000" cy="1275544"/>
+          </a:xfrm>
+        </p:grpSpPr>
+        <p:sp>
+          <p:nvSpPr>
+            <p:cNvPr id="62" name="Rettangolo 61"/>
+            <p:cNvSpPr/>
+            <p:nvPr/>
+          </p:nvSpPr>
+          <p:spPr>
+            <a:xfrm>
+              <a:off x="6154113" y="332656"/>
+              <a:ext cx="1260000" cy="1260000"/>
+            </a:xfrm>
+            <a:prstGeom prst="rect">
+              <a:avLst/>
+            </a:prstGeom>
+            <a:noFill/>
+            <a:ln w="3175"/>
+          </p:spPr>
+          <p:style>
+            <a:lnRef idx="2">
+              <a:schemeClr val="accent1">
+                <a:shade val="50000"/>
+              </a:schemeClr>
+            </a:lnRef>
+            <a:fillRef idx="1">
+              <a:schemeClr val="accent1"/>
+            </a:fillRef>
+            <a:effectRef idx="0">
+              <a:schemeClr val="accent1"/>
+            </a:effectRef>
+            <a:fontRef idx="minor">
+              <a:schemeClr val="lt1"/>
+            </a:fontRef>
+          </p:style>
+          <p:txBody>
+            <a:bodyPr rtlCol="0" anchor="ctr"/>
+            <a:lstStyle/>
+            <a:p>
+              <a:pPr algn="ctr"/>
+              <a:endParaRPr lang="en-US">
+                <a:noFill/>
+              </a:endParaRPr>
+            </a:p>
+          </p:txBody>
+        </p:sp>
+        <p:pic>
+          <p:nvPicPr>
+            <p:cNvPr id="1042" name="Picture 18" descr="D:\Vaa3D\vaa3d_tools\released_plugins\v3d_plugins\teramanager\icons\clear.jpg"/>
+            <p:cNvPicPr>
+              <a:picLocks noChangeArrowheads="1"/>
+            </p:cNvPicPr>
+            <p:nvPr/>
+          </p:nvPicPr>
+          <p:blipFill>
+            <a:blip r:embed="rId12">
+              <a:extLst>
+                <a:ext uri="{BEBA8EAE-BF5A-486C-A8C5-ECC9F3942E4B}">
+                  <a14:imgProps xmlns:a14="http://schemas.microsoft.com/office/drawing/2010/main">
+                    <a14:imgLayer r:embed="rId13">
+                      <a14:imgEffect>
+                        <a14:backgroundRemoval t="4000" b="97778" l="2667" r="95111"/>
+                      </a14:imgEffect>
+                    </a14:imgLayer>
+                  </a14:imgProps>
+                </a:ext>
+                <a:ext uri="{28A0092B-C50C-407E-A947-70E740481C1C}">
+                  <a14:useLocalDpi xmlns:a14="http://schemas.microsoft.com/office/drawing/2010/main" val="0"/>
+                </a:ext>
+              </a:extLst>
+            </a:blip>
+            <a:srcRect/>
+            <a:stretch>
+              <a:fillRect/>
+            </a:stretch>
+          </p:blipFill>
+          <p:spPr bwMode="auto">
+            <a:xfrm>
+              <a:off x="6257134" y="348200"/>
+              <a:ext cx="1116000" cy="1260000"/>
             </a:xfrm>
             <a:prstGeom prst="rect">
               <a:avLst/>

</xml_diff>

<commit_message>
TeraFly version 0.9.95 June 23rd, 2014 -------------------------------------------------------------------------------------------- - New: added feature "Show/hide markers around the ROI" in the TeraFly's  annotation toolbar.        The user  chan  show/hide the markers  in a X/Y/Z% neighborhood  of the displayed ROI.        X/Y/Z% can be set from the "Option" popup menu.        This feature is intended for helping the user in proof-editing mode. In particular, by        displaying/hiding the markers the user can better identify any false positives / false        negatives close to the border of the displayed ROI. - New: added "Options" popup menu in the TeraFly's annotation toolbar.  The user can  set all        the options related to each annotation feature. Changes are saved permanently. - Fix: fixed compilation bug on clang compiler. --------------------------------------------------------------------------------------------
</commit_message>
<xml_diff>
--- a/released_plugins/v3d_plugins/teramanager/icons.pptx
+++ b/released_plugins/v3d_plugins/teramanager/icons.pptx
@@ -289,7 +289,7 @@
           <a:p>
             <a:fld id="{A3FFFC81-E8A9-43A5-BD7A-0818E158DC6F}" type="datetimeFigureOut">
               <a:rPr lang="en-US" smtClean="0"/>
-              <a:t>6/19/2014</a:t>
+              <a:t>6/23/2014</a:t>
             </a:fld>
             <a:endParaRPr lang="en-US"/>
           </a:p>
@@ -459,7 +459,7 @@
           <a:p>
             <a:fld id="{A3FFFC81-E8A9-43A5-BD7A-0818E158DC6F}" type="datetimeFigureOut">
               <a:rPr lang="en-US" smtClean="0"/>
-              <a:t>6/19/2014</a:t>
+              <a:t>6/23/2014</a:t>
             </a:fld>
             <a:endParaRPr lang="en-US"/>
           </a:p>
@@ -639,7 +639,7 @@
           <a:p>
             <a:fld id="{A3FFFC81-E8A9-43A5-BD7A-0818E158DC6F}" type="datetimeFigureOut">
               <a:rPr lang="en-US" smtClean="0"/>
-              <a:t>6/19/2014</a:t>
+              <a:t>6/23/2014</a:t>
             </a:fld>
             <a:endParaRPr lang="en-US"/>
           </a:p>
@@ -809,7 +809,7 @@
           <a:p>
             <a:fld id="{A3FFFC81-E8A9-43A5-BD7A-0818E158DC6F}" type="datetimeFigureOut">
               <a:rPr lang="en-US" smtClean="0"/>
-              <a:t>6/19/2014</a:t>
+              <a:t>6/23/2014</a:t>
             </a:fld>
             <a:endParaRPr lang="en-US"/>
           </a:p>
@@ -1055,7 +1055,7 @@
           <a:p>
             <a:fld id="{A3FFFC81-E8A9-43A5-BD7A-0818E158DC6F}" type="datetimeFigureOut">
               <a:rPr lang="en-US" smtClean="0"/>
-              <a:t>6/19/2014</a:t>
+              <a:t>6/23/2014</a:t>
             </a:fld>
             <a:endParaRPr lang="en-US"/>
           </a:p>
@@ -1343,7 +1343,7 @@
           <a:p>
             <a:fld id="{A3FFFC81-E8A9-43A5-BD7A-0818E158DC6F}" type="datetimeFigureOut">
               <a:rPr lang="en-US" smtClean="0"/>
-              <a:t>6/19/2014</a:t>
+              <a:t>6/23/2014</a:t>
             </a:fld>
             <a:endParaRPr lang="en-US"/>
           </a:p>
@@ -1765,7 +1765,7 @@
           <a:p>
             <a:fld id="{A3FFFC81-E8A9-43A5-BD7A-0818E158DC6F}" type="datetimeFigureOut">
               <a:rPr lang="en-US" smtClean="0"/>
-              <a:t>6/19/2014</a:t>
+              <a:t>6/23/2014</a:t>
             </a:fld>
             <a:endParaRPr lang="en-US"/>
           </a:p>
@@ -1883,7 +1883,7 @@
           <a:p>
             <a:fld id="{A3FFFC81-E8A9-43A5-BD7A-0818E158DC6F}" type="datetimeFigureOut">
               <a:rPr lang="en-US" smtClean="0"/>
-              <a:t>6/19/2014</a:t>
+              <a:t>6/23/2014</a:t>
             </a:fld>
             <a:endParaRPr lang="en-US"/>
           </a:p>
@@ -1978,7 +1978,7 @@
           <a:p>
             <a:fld id="{A3FFFC81-E8A9-43A5-BD7A-0818E158DC6F}" type="datetimeFigureOut">
               <a:rPr lang="en-US" smtClean="0"/>
-              <a:t>6/19/2014</a:t>
+              <a:t>6/23/2014</a:t>
             </a:fld>
             <a:endParaRPr lang="en-US"/>
           </a:p>
@@ -2255,7 +2255,7 @@
           <a:p>
             <a:fld id="{A3FFFC81-E8A9-43A5-BD7A-0818E158DC6F}" type="datetimeFigureOut">
               <a:rPr lang="en-US" smtClean="0"/>
-              <a:t>6/19/2014</a:t>
+              <a:t>6/23/2014</a:t>
             </a:fld>
             <a:endParaRPr lang="en-US"/>
           </a:p>
@@ -2508,7 +2508,7 @@
           <a:p>
             <a:fld id="{A3FFFC81-E8A9-43A5-BD7A-0818E158DC6F}" type="datetimeFigureOut">
               <a:rPr lang="en-US" smtClean="0"/>
-              <a:t>6/19/2014</a:t>
+              <a:t>6/23/2014</a:t>
             </a:fld>
             <a:endParaRPr lang="en-US"/>
           </a:p>
@@ -2721,7 +2721,7 @@
           <a:p>
             <a:fld id="{A3FFFC81-E8A9-43A5-BD7A-0818E158DC6F}" type="datetimeFigureOut">
               <a:rPr lang="en-US" smtClean="0"/>
-              <a:t>6/19/2014</a:t>
+              <a:t>6/23/2014</a:t>
             </a:fld>
             <a:endParaRPr lang="en-US"/>
           </a:p>
@@ -6017,9 +6017,50 @@
           </a:extLst>
         </p:spPr>
       </p:pic>
+      <p:pic>
+        <p:nvPicPr>
+          <p:cNvPr id="2" name="Picture 2" descr="http://icons.iconarchive.com/icons/visualpharm/must-have/256/Undo-icon.png"/>
+          <p:cNvPicPr>
+            <a:picLocks noChangeAspect="1" noChangeArrowheads="1"/>
+          </p:cNvPicPr>
+          <p:nvPr/>
+        </p:nvPicPr>
+        <p:blipFill>
+          <a:blip r:embed="rId14">
+            <a:extLst>
+              <a:ext uri="{28A0092B-C50C-407E-A947-70E740481C1C}">
+                <a14:useLocalDpi xmlns:a14="http://schemas.microsoft.com/office/drawing/2010/main" val="0"/>
+              </a:ext>
+            </a:extLst>
+          </a:blip>
+          <a:srcRect/>
+          <a:stretch>
+            <a:fillRect/>
+          </a:stretch>
+        </p:blipFill>
+        <p:spPr bwMode="auto">
+          <a:xfrm>
+            <a:off x="2740103" y="4370504"/>
+            <a:ext cx="1080000" cy="1080000"/>
+          </a:xfrm>
+          <a:prstGeom prst="rect">
+            <a:avLst/>
+          </a:prstGeom>
+          <a:noFill/>
+          <a:extLst>
+            <a:ext uri="{909E8E84-426E-40DD-AFC4-6F175D3DCCD1}">
+              <a14:hiddenFill xmlns:a14="http://schemas.microsoft.com/office/drawing/2010/main">
+                <a:solidFill>
+                  <a:srgbClr val="FFFFFF"/>
+                </a:solidFill>
+              </a14:hiddenFill>
+            </a:ext>
+          </a:extLst>
+        </p:spPr>
+      </p:pic>
       <p:grpSp>
         <p:nvGrpSpPr>
-          <p:cNvPr id="4" name="Gruppo 3"/>
+          <p:cNvPr id="15" name="Gruppo 14"/>
           <p:cNvGrpSpPr/>
           <p:nvPr/>
         </p:nvGrpSpPr>
@@ -6077,14 +6118,14 @@
         </p:sp>
         <p:pic>
           <p:nvPicPr>
-            <p:cNvPr id="2" name="Picture 2" descr="http://icons.iconarchive.com/icons/visualpharm/must-have/256/Undo-icon.png"/>
+            <p:cNvPr id="1028" name="Picture 4" descr="http://static.iwebreader.com/wr/img/icons/big/config.png"/>
             <p:cNvPicPr>
               <a:picLocks noChangeAspect="1" noChangeArrowheads="1"/>
             </p:cNvPicPr>
             <p:nvPr/>
           </p:nvPicPr>
           <p:blipFill>
-            <a:blip r:embed="rId14">
+            <a:blip r:embed="rId15">
               <a:extLst>
                 <a:ext uri="{28A0092B-C50C-407E-A947-70E740481C1C}">
                   <a14:useLocalDpi xmlns:a14="http://schemas.microsoft.com/office/drawing/2010/main" val="0"/>
@@ -6098,8 +6139,8 @@
           </p:blipFill>
           <p:spPr bwMode="auto">
             <a:xfrm>
-              <a:off x="6256110" y="453824"/>
-              <a:ext cx="1080000" cy="1080000"/>
+              <a:off x="6222693" y="400464"/>
+              <a:ext cx="1116000" cy="1116000"/>
             </a:xfrm>
             <a:prstGeom prst="rect">
               <a:avLst/>

</xml_diff>